<commit_message>
saving my version to be overwritten
</commit_message>
<xml_diff>
--- a/Beers of the USA.pptx
+++ b/Beers of the USA.pptx
@@ -4896,7 +4896,7 @@
         </p:nvSpPr>
         <p:spPr>
           <a:xfrm>
-            <a:off x="5460540" y="4173238"/>
+            <a:off x="5452215" y="4110678"/>
             <a:ext cx="2227006" cy="2209028"/>
           </a:xfrm>
           <a:prstGeom prst="flowChartConnector">
@@ -5184,8 +5184,8 @@
         </p:nvCxnSpPr>
         <p:spPr>
           <a:xfrm rot="16200000" flipH="1">
-            <a:off x="5802975" y="3402170"/>
-            <a:ext cx="928832" cy="613303"/>
+            <a:off x="5830093" y="3375053"/>
+            <a:ext cx="866272" cy="604978"/>
           </a:xfrm>
           <a:prstGeom prst="curvedConnector3">
             <a:avLst/>
@@ -6527,21 +6527,21 @@
 </file>
 
 <file path=customXml/item1.xml><?xml version="1.0" encoding="utf-8"?>
+<?mso-contentType ?>
+<FormTemplates xmlns="http://schemas.microsoft.com/sharepoint/v3/contenttype/forms">
+  <Display>DocumentLibraryForm</Display>
+  <Edit>DocumentLibraryForm</Edit>
+  <New>DocumentLibraryForm</New>
+</FormTemplates>
+</file>
+
+<file path=customXml/item2.xml><?xml version="1.0" encoding="utf-8"?>
 <p:properties xmlns:p="http://schemas.microsoft.com/office/2006/metadata/properties" xmlns:xsi="http://www.w3.org/2001/XMLSchema-instance" xmlns:pc="http://schemas.microsoft.com/office/infopath/2007/PartnerControls">
   <documentManagement>
     <Status xmlns="71af3243-3dd4-4a8d-8c0d-dd76da1f02a5">Not started</Status>
     <MediaServiceKeyPoints xmlns="71af3243-3dd4-4a8d-8c0d-dd76da1f02a5" xsi:nil="true"/>
   </documentManagement>
 </p:properties>
-</file>
-
-<file path=customXml/item2.xml><?xml version="1.0" encoding="utf-8"?>
-<?mso-contentType ?>
-<FormTemplates xmlns="http://schemas.microsoft.com/sharepoint/v3/contenttype/forms">
-  <Display>DocumentLibraryForm</Display>
-  <Edit>DocumentLibraryForm</Edit>
-  <New>DocumentLibraryForm</New>
-</FormTemplates>
 </file>
 
 <file path=customXml/item3.xml><?xml version="1.0" encoding="utf-8"?>
@@ -6766,19 +6766,19 @@
 </file>
 
 <file path=customXml/itemProps1.xml><?xml version="1.0" encoding="utf-8"?>
+<ds:datastoreItem xmlns:ds="http://schemas.openxmlformats.org/officeDocument/2006/customXml" ds:itemID="{927BD4C1-B6B1-4715-ABF9-E660A51A4EA0}">
+  <ds:schemaRefs>
+    <ds:schemaRef ds:uri="http://schemas.microsoft.com/sharepoint/v3/contenttype/forms"/>
+  </ds:schemaRefs>
+</ds:datastoreItem>
+</file>
+
+<file path=customXml/itemProps2.xml><?xml version="1.0" encoding="utf-8"?>
 <ds:datastoreItem xmlns:ds="http://schemas.openxmlformats.org/officeDocument/2006/customXml" ds:itemID="{8D289AE2-D2AE-49D1-AFAC-3A79F6794255}">
   <ds:schemaRefs>
     <ds:schemaRef ds:uri="http://schemas.microsoft.com/office/2006/metadata/properties"/>
     <ds:schemaRef ds:uri="http://schemas.microsoft.com/office/infopath/2007/PartnerControls"/>
     <ds:schemaRef ds:uri="71af3243-3dd4-4a8d-8c0d-dd76da1f02a5"/>
-  </ds:schemaRefs>
-</ds:datastoreItem>
-</file>
-
-<file path=customXml/itemProps2.xml><?xml version="1.0" encoding="utf-8"?>
-<ds:datastoreItem xmlns:ds="http://schemas.openxmlformats.org/officeDocument/2006/customXml" ds:itemID="{927BD4C1-B6B1-4715-ABF9-E660A51A4EA0}">
-  <ds:schemaRefs>
-    <ds:schemaRef ds:uri="http://schemas.microsoft.com/sharepoint/v3/contenttype/forms"/>
   </ds:schemaRefs>
 </ds:datastoreItem>
 </file>

</xml_diff>